<commit_message>
add while loop problem
</commit_message>
<xml_diff>
--- a/slide.pptx
+++ b/slide.pptx
@@ -277,7 +277,7 @@
           <a:p>
             <a:fld id="{5317422C-58FD-46E8-8C27-40405649705F}" type="datetimeFigureOut">
               <a:rPr lang="th-TH" smtClean="0"/>
-              <a:t>16/11/65</a:t>
+              <a:t>18/11/65</a:t>
             </a:fld>
             <a:endParaRPr lang="th-TH"/>
           </a:p>
@@ -477,7 +477,7 @@
           <a:p>
             <a:fld id="{5317422C-58FD-46E8-8C27-40405649705F}" type="datetimeFigureOut">
               <a:rPr lang="th-TH" smtClean="0"/>
-              <a:t>16/11/65</a:t>
+              <a:t>18/11/65</a:t>
             </a:fld>
             <a:endParaRPr lang="th-TH"/>
           </a:p>
@@ -687,7 +687,7 @@
           <a:p>
             <a:fld id="{5317422C-58FD-46E8-8C27-40405649705F}" type="datetimeFigureOut">
               <a:rPr lang="th-TH" smtClean="0"/>
-              <a:t>16/11/65</a:t>
+              <a:t>18/11/65</a:t>
             </a:fld>
             <a:endParaRPr lang="th-TH"/>
           </a:p>
@@ -887,7 +887,7 @@
           <a:p>
             <a:fld id="{5317422C-58FD-46E8-8C27-40405649705F}" type="datetimeFigureOut">
               <a:rPr lang="th-TH" smtClean="0"/>
-              <a:t>16/11/65</a:t>
+              <a:t>18/11/65</a:t>
             </a:fld>
             <a:endParaRPr lang="th-TH"/>
           </a:p>
@@ -1163,7 +1163,7 @@
           <a:p>
             <a:fld id="{5317422C-58FD-46E8-8C27-40405649705F}" type="datetimeFigureOut">
               <a:rPr lang="th-TH" smtClean="0"/>
-              <a:t>16/11/65</a:t>
+              <a:t>18/11/65</a:t>
             </a:fld>
             <a:endParaRPr lang="th-TH"/>
           </a:p>
@@ -1431,7 +1431,7 @@
           <a:p>
             <a:fld id="{5317422C-58FD-46E8-8C27-40405649705F}" type="datetimeFigureOut">
               <a:rPr lang="th-TH" smtClean="0"/>
-              <a:t>16/11/65</a:t>
+              <a:t>18/11/65</a:t>
             </a:fld>
             <a:endParaRPr lang="th-TH"/>
           </a:p>
@@ -1846,7 +1846,7 @@
           <a:p>
             <a:fld id="{5317422C-58FD-46E8-8C27-40405649705F}" type="datetimeFigureOut">
               <a:rPr lang="th-TH" smtClean="0"/>
-              <a:t>16/11/65</a:t>
+              <a:t>18/11/65</a:t>
             </a:fld>
             <a:endParaRPr lang="th-TH"/>
           </a:p>
@@ -1988,7 +1988,7 @@
           <a:p>
             <a:fld id="{5317422C-58FD-46E8-8C27-40405649705F}" type="datetimeFigureOut">
               <a:rPr lang="th-TH" smtClean="0"/>
-              <a:t>16/11/65</a:t>
+              <a:t>18/11/65</a:t>
             </a:fld>
             <a:endParaRPr lang="th-TH"/>
           </a:p>
@@ -2101,7 +2101,7 @@
           <a:p>
             <a:fld id="{5317422C-58FD-46E8-8C27-40405649705F}" type="datetimeFigureOut">
               <a:rPr lang="th-TH" smtClean="0"/>
-              <a:t>16/11/65</a:t>
+              <a:t>18/11/65</a:t>
             </a:fld>
             <a:endParaRPr lang="th-TH"/>
           </a:p>
@@ -2414,7 +2414,7 @@
           <a:p>
             <a:fld id="{5317422C-58FD-46E8-8C27-40405649705F}" type="datetimeFigureOut">
               <a:rPr lang="th-TH" smtClean="0"/>
-              <a:t>16/11/65</a:t>
+              <a:t>18/11/65</a:t>
             </a:fld>
             <a:endParaRPr lang="th-TH"/>
           </a:p>
@@ -2703,7 +2703,7 @@
           <a:p>
             <a:fld id="{5317422C-58FD-46E8-8C27-40405649705F}" type="datetimeFigureOut">
               <a:rPr lang="th-TH" smtClean="0"/>
-              <a:t>16/11/65</a:t>
+              <a:t>18/11/65</a:t>
             </a:fld>
             <a:endParaRPr lang="th-TH"/>
           </a:p>
@@ -2946,7 +2946,7 @@
           <a:p>
             <a:fld id="{5317422C-58FD-46E8-8C27-40405649705F}" type="datetimeFigureOut">
               <a:rPr lang="th-TH" smtClean="0"/>
-              <a:t>16/11/65</a:t>
+              <a:t>18/11/65</a:t>
             </a:fld>
             <a:endParaRPr lang="th-TH"/>
           </a:p>
@@ -4894,7 +4894,23 @@
                 <a:ea typeface="Cascadia Code" panose="020B0609020000020004" pitchFamily="49" charset="0"/>
                 <a:cs typeface="Cascadia Code" panose="020B0609020000020004" pitchFamily="49" charset="0"/>
               </a:rPr>
-              <a:t>range(x,y)</a:t>
+              <a:t>range(</a:t>
+            </a:r>
+            <a:r>
+              <a:rPr lang="en-US" sz="2400" dirty="0" err="1">
+                <a:latin typeface="Cascadia Code" panose="020B0609020000020004" pitchFamily="49" charset="0"/>
+                <a:ea typeface="Cascadia Code" panose="020B0609020000020004" pitchFamily="49" charset="0"/>
+                <a:cs typeface="Cascadia Code" panose="020B0609020000020004" pitchFamily="49" charset="0"/>
+              </a:rPr>
+              <a:t>x,y</a:t>
+            </a:r>
+            <a:r>
+              <a:rPr lang="en-US" sz="2400" dirty="0">
+                <a:latin typeface="Cascadia Code" panose="020B0609020000020004" pitchFamily="49" charset="0"/>
+                <a:ea typeface="Cascadia Code" panose="020B0609020000020004" pitchFamily="49" charset="0"/>
+                <a:cs typeface="Cascadia Code" panose="020B0609020000020004" pitchFamily="49" charset="0"/>
+              </a:rPr>
+              <a:t>) </a:t>
             </a:r>
             <a:r>
               <a:rPr lang="th-TH" sz="2400" dirty="0">
@@ -4902,7 +4918,7 @@
                 <a:ea typeface="Cascadia Code" panose="020B0609020000020004" pitchFamily="49" charset="0"/>
                 <a:cs typeface="Cascadia Code" panose="020B0609020000020004" pitchFamily="49" charset="0"/>
               </a:rPr>
-              <a:t> คือลูปตั้งแต่ </a:t>
+              <a:t>คือลูปตั้งแต่ </a:t>
             </a:r>
             <a:r>
               <a:rPr lang="en-US" sz="2400" dirty="0">
@@ -7077,8 +7093,8 @@
         </p:nvSpPr>
         <p:spPr>
           <a:xfrm>
-            <a:off x="6754483" y="3870175"/>
-            <a:ext cx="4635260" cy="1446550"/>
+            <a:off x="6754483" y="3506883"/>
+            <a:ext cx="4635260" cy="1877437"/>
           </a:xfrm>
           <a:prstGeom prst="rect">
             <a:avLst/>
@@ -7145,21 +7161,35 @@
             </a:r>
           </a:p>
           <a:p>
+            <a:pPr marL="342900" indent="-342900">
+              <a:buFontTx/>
+              <a:buChar char="-"/>
+            </a:pPr>
+            <a:r>
+              <a:rPr lang="th-TH" sz="2000" dirty="0">
+                <a:latin typeface="Cascadia Code" panose="020B0609020000020004" pitchFamily="49" charset="0"/>
+                <a:ea typeface="Cascadia Code" panose="020B0609020000020004" pitchFamily="49" charset="0"/>
+                <a:cs typeface="Cascadia Code" panose="020B0609020000020004" pitchFamily="49" charset="0"/>
+              </a:rPr>
+              <a:t>จะได้ค่าฟังก์ชั่นตรีโกณ </a:t>
+            </a:r>
             <a:r>
               <a:rPr lang="en-US" sz="2000" dirty="0">
                 <a:latin typeface="Cascadia Code" panose="020B0609020000020004" pitchFamily="49" charset="0"/>
                 <a:ea typeface="Cascadia Code" panose="020B0609020000020004" pitchFamily="49" charset="0"/>
                 <a:cs typeface="Cascadia Code" panose="020B0609020000020004" pitchFamily="49" charset="0"/>
               </a:rPr>
-              <a:t>- </a:t>
-            </a:r>
+              <a:t>sin cos tan</a:t>
+            </a:r>
+          </a:p>
+          <a:p>
             <a:r>
               <a:rPr lang="th-TH" sz="2000" dirty="0">
                 <a:latin typeface="Cascadia Code" panose="020B0609020000020004" pitchFamily="49" charset="0"/>
                 <a:ea typeface="Cascadia Code" panose="020B0609020000020004" pitchFamily="49" charset="0"/>
                 <a:cs typeface="Cascadia Code" panose="020B0609020000020004" pitchFamily="49" charset="0"/>
               </a:rPr>
-              <a:t>จะได้ค่าฟังก์ชั่นตรีโกณ </a:t>
+              <a:t>โดย </a:t>
             </a:r>
             <a:r>
               <a:rPr lang="en-US" sz="2000" dirty="0">
@@ -7167,7 +7197,23 @@
                 <a:ea typeface="Cascadia Code" panose="020B0609020000020004" pitchFamily="49" charset="0"/>
                 <a:cs typeface="Cascadia Code" panose="020B0609020000020004" pitchFamily="49" charset="0"/>
               </a:rPr>
-              <a:t>sin cos tan</a:t>
+              <a:t>x </a:t>
+            </a:r>
+            <a:r>
+              <a:rPr lang="th-TH" sz="2000" dirty="0">
+                <a:latin typeface="Cascadia Code" panose="020B0609020000020004" pitchFamily="49" charset="0"/>
+                <a:ea typeface="Cascadia Code" panose="020B0609020000020004" pitchFamily="49" charset="0"/>
+                <a:cs typeface="Cascadia Code" panose="020B0609020000020004" pitchFamily="49" charset="0"/>
+              </a:rPr>
+              <a:t>มีหน่วยเป็น</a:t>
+            </a:r>
+            <a:r>
+              <a:rPr lang="en-US" sz="2000" dirty="0">
+                <a:latin typeface="Cascadia Code" panose="020B0609020000020004" pitchFamily="49" charset="0"/>
+                <a:ea typeface="Cascadia Code" panose="020B0609020000020004" pitchFamily="49" charset="0"/>
+                <a:cs typeface="Cascadia Code" panose="020B0609020000020004" pitchFamily="49" charset="0"/>
+              </a:rPr>
+              <a:t> radian</a:t>
             </a:r>
             <a:endParaRPr lang="th-TH" sz="2000" dirty="0"/>
           </a:p>

</xml_diff>

<commit_message>
add pdf and camp title
</commit_message>
<xml_diff>
--- a/slide.pptx
+++ b/slide.pptx
@@ -3418,8 +3418,8 @@
         </p:nvSpPr>
         <p:spPr>
           <a:xfrm>
-            <a:off x="3537504" y="3157592"/>
-            <a:ext cx="5945128" cy="769441"/>
+            <a:off x="3537504" y="2872920"/>
+            <a:ext cx="5945128" cy="1323439"/>
           </a:xfrm>
           <a:prstGeom prst="rect">
             <a:avLst/>
@@ -3431,6 +3431,22 @@
             <a:spAutoFit/>
           </a:bodyPr>
           <a:lstStyle/>
+          <a:p>
+            <a:pPr algn="ctr"/>
+            <a:r>
+              <a:rPr lang="en-US" sz="3600" dirty="0">
+                <a:latin typeface="Cascadia Code" panose="020B0609020000020004" pitchFamily="49" charset="0"/>
+                <a:ea typeface="Cascadia Code" panose="020B0609020000020004" pitchFamily="49" charset="0"/>
+                <a:cs typeface="Cascadia Code" panose="020B0609020000020004" pitchFamily="49" charset="0"/>
+              </a:rPr>
+              <a:t>Let Me Tired Camp #2</a:t>
+            </a:r>
+            <a:endParaRPr lang="en-US" sz="4400" dirty="0">
+              <a:latin typeface="Cascadia Code" panose="020B0609020000020004" pitchFamily="49" charset="0"/>
+              <a:ea typeface="Cascadia Code" panose="020B0609020000020004" pitchFamily="49" charset="0"/>
+              <a:cs typeface="Cascadia Code" panose="020B0609020000020004" pitchFamily="49" charset="0"/>
+            </a:endParaRPr>
+          </a:p>
           <a:p>
             <a:pPr algn="ctr"/>
             <a:r>
@@ -12814,7 +12830,7 @@
         </p:nvSpPr>
         <p:spPr>
           <a:xfrm>
-            <a:off x="1119995" y="1404382"/>
+            <a:off x="1706592" y="1404382"/>
             <a:ext cx="3959525" cy="4767907"/>
           </a:xfrm>
         </p:spPr>

</xml_diff>